<commit_message>
Check if text uploads
</commit_message>
<xml_diff>
--- a/Question_5/Question_5_README.pptx
+++ b/Question_5/Question_5_README.pptx
@@ -3265,12 +3265,7 @@
             <p:ph type="title"/>
           </p:nvPr>
         </p:nvSpPr>
-        <p:spPr>
-          <a:xfrm>
-            <a:off x="457201" y="204787"/>
-            <a:ext cx="3008313" cy="871538"/>
-          </a:xfrm>
-        </p:spPr>
+        <p:spPr/>
         <p:txBody>
           <a:bodyPr/>
           <a:lstStyle/>
@@ -3281,40 +3276,6 @@
             <a:r>
               <a:rPr/>
               <a:t>Sleep vs Exercise as determinants of health</a:t>
-            </a:r>
-          </a:p>
-        </p:txBody>
-      </p:sp>
-      <p:sp>
-        <p:nvSpPr>
-          <p:cNvPr id="4" name="Text Placeholder 3"/>
-          <p:cNvSpPr>
-            <a:spLocks noGrp="1"/>
-          </p:cNvSpPr>
-          <p:nvPr>
-            <p:ph idx="2" sz="half" type="body"/>
-          </p:nvPr>
-        </p:nvSpPr>
-        <p:spPr/>
-        <p:txBody>
-          <a:bodyPr/>
-          <a:lstStyle/>
-          <a:p>
-            <a:pPr lvl="0" indent="0" marL="0">
-              <a:buNone/>
-            </a:pPr>
-            <a:r>
-              <a:rPr/>
-              <a:t>This first section tests the theory whether sleep is a better determinant of good health than exercise is. Here we use the stress level as a proxy for level of well-being, with higher stress indicating worse health.</a:t>
-            </a:r>
-          </a:p>
-          <a:p>
-            <a:pPr lvl="0" indent="0" marL="0">
-              <a:buNone/>
-            </a:pPr>
-            <a:r>
-              <a:rPr/>
-              <a:t>To do this, we compare through use of a heat map how exercise and sleep jointly affect stress.</a:t>
             </a:r>
           </a:p>
         </p:txBody>
@@ -3335,8 +3296,8 @@
         </p:blipFill>
         <p:spPr bwMode="auto">
           <a:xfrm>
-            <a:off x="3568700" y="266700"/>
-            <a:ext cx="5105400" cy="4254500"/>
+            <a:off x="2540000" y="1193800"/>
+            <a:ext cx="4064000" cy="3390900"/>
           </a:xfrm>
           <a:prstGeom prst="rect">
             <a:avLst/>

</xml_diff>

<commit_message>
Question 5 mostly done
</commit_message>
<xml_diff>
--- a/Question_5/Question_5_README.pptx
+++ b/Question_5/Question_5_README.pptx
@@ -10,6 +10,7 @@
     <p:sldId id="258" r:id="rId4"/>
     <p:sldId id="259" r:id="rId5"/>
     <p:sldId id="260" r:id="rId6"/>
+    <p:sldId id="261" r:id="rId7"/>
   </p:sldIdLst>
   <p:sldSz cx="9144000" cy="5143500" type="screen16x9"/>
   <p:notesSz cx="6858000" cy="9144000"/>
@@ -3219,15 +3220,6 @@
             </a:pPr>
             <a:r>
               <a:rPr/>
-              <a:t>Fama &amp; French (1997)</a:t>
-            </a:r>
-          </a:p>
-          <a:p>
-            <a:pPr lvl="0" indent="0" marL="0">
-              <a:buNone/>
-            </a:pPr>
-            <a:r>
-              <a:rPr/>
               <a:t>In this question, I aim to provide a few insights into different determinants of good health.</a:t>
             </a:r>
           </a:p>
@@ -3296,8 +3288,8 @@
         </p:blipFill>
         <p:spPr bwMode="auto">
           <a:xfrm>
-            <a:off x="2540000" y="1193800"/>
-            <a:ext cx="4064000" cy="3390900"/>
+            <a:off x="2844800" y="1193800"/>
+            <a:ext cx="3454400" cy="2882900"/>
           </a:xfrm>
           <a:prstGeom prst="rect">
             <a:avLst/>
@@ -3310,6 +3302,36 @@
           </a:ln>
         </p:spPr>
       </p:pic>
+      <p:sp>
+        <p:nvSpPr>
+          <p:cNvPr id="1" name="TextBox 3"/>
+          <p:cNvSpPr txBox="1"/>
+          <p:nvPr/>
+        </p:nvSpPr>
+        <p:spPr>
+          <a:xfrm>
+            <a:off x="457200" y="4076700"/>
+            <a:ext cx="8229600" cy="508000"/>
+          </a:xfrm>
+          <a:prstGeom prst="rect">
+            <a:avLst/>
+          </a:prstGeom>
+          <a:noFill/>
+        </p:spPr>
+        <p:txBody>
+          <a:bodyPr/>
+          <a:lstStyle/>
+          <a:p>
+            <a:pPr lvl="0" indent="0" marL="0" algn="ctr">
+              <a:buNone/>
+            </a:pPr>
+            <a:r>
+              <a:rPr/>
+              <a:t>Heatmap showing the relationship between sleep and exercise on stress </a:t>
+            </a:r>
+          </a:p>
+        </p:txBody>
+      </p:sp>
     </p:spTree>
   </p:cSld>
 </p:sld>
@@ -3352,40 +3374,67 @@
             </a:pPr>
             <a:r>
               <a:rPr/>
-              <a:t>References</a:t>
-            </a:r>
-          </a:p>
-        </p:txBody>
-      </p:sp>
-      <p:sp>
-        <p:nvSpPr>
-          <p:cNvPr id="3" name="Content Placeholder 2"/>
-          <p:cNvSpPr>
-            <a:spLocks noGrp="1"/>
-          </p:cNvSpPr>
-          <p:nvPr>
-            <p:ph idx="1"/>
-          </p:nvPr>
-        </p:nvSpPr>
-        <p:spPr/>
-        <p:txBody>
-          <a:bodyPr/>
-          <a:lstStyle/>
-          <a:p>
-            <a:pPr lvl="0" indent="0" marL="0">
+              <a:t>Sleep and weight change</a:t>
+            </a:r>
+          </a:p>
+        </p:txBody>
+      </p:sp>
+      <p:pic>
+        <p:nvPicPr>
+          <p:cNvPr descr="Question_5_README_files/figure-pptx/unnamed-chunk-2-1.png" id="0" name="Picture 1"/>
+          <p:cNvPicPr>
+            <a:picLocks noGrp="1" noChangeAspect="1"/>
+          </p:cNvPicPr>
+          <p:nvPr/>
+        </p:nvPicPr>
+        <p:blipFill>
+          <a:blip r:embed="rId2"/>
+          <a:stretch>
+            <a:fillRect/>
+          </a:stretch>
+        </p:blipFill>
+        <p:spPr bwMode="auto">
+          <a:xfrm>
+            <a:off x="2844800" y="1193800"/>
+            <a:ext cx="3454400" cy="2882900"/>
+          </a:xfrm>
+          <a:prstGeom prst="rect">
+            <a:avLst/>
+          </a:prstGeom>
+          <a:noFill/>
+          <a:ln w="9525">
+            <a:noFill/>
+            <a:headEnd/>
+            <a:tailEnd/>
+          </a:ln>
+        </p:spPr>
+      </p:pic>
+      <p:sp>
+        <p:nvSpPr>
+          <p:cNvPr id="1" name="TextBox 3"/>
+          <p:cNvSpPr txBox="1"/>
+          <p:nvPr/>
+        </p:nvSpPr>
+        <p:spPr>
+          <a:xfrm>
+            <a:off x="457200" y="4076700"/>
+            <a:ext cx="8229600" cy="508000"/>
+          </a:xfrm>
+          <a:prstGeom prst="rect">
+            <a:avLst/>
+          </a:prstGeom>
+          <a:noFill/>
+        </p:spPr>
+        <p:txBody>
+          <a:bodyPr/>
+          <a:lstStyle/>
+          <a:p>
+            <a:pPr lvl="0" indent="0" marL="0" algn="ctr">
               <a:buNone/>
             </a:pPr>
             <a:r>
               <a:rPr/>
-              <a:t>Fama, E.F. &amp; French, K.R. 1997. Industry costs of equity. </a:t>
-            </a:r>
-            <a:r>
-              <a:rPr i="1"/>
-              <a:t>Journal of financial economics</a:t>
-            </a:r>
-            <a:r>
-              <a:rPr/>
-              <a:t>. 43(2):153–193.</a:t>
+              <a:t>Boxplot showing the relationship between sleep quality and weight change </a:t>
             </a:r>
           </a:p>
         </p:txBody>
@@ -3432,7 +3481,114 @@
             </a:pPr>
             <a:r>
               <a:rPr/>
-              <a:t>Appendix</a:t>
+              <a:t>Exercise and calorie balance</a:t>
+            </a:r>
+          </a:p>
+        </p:txBody>
+      </p:sp>
+      <p:pic>
+        <p:nvPicPr>
+          <p:cNvPr descr="Question_5_README_files/figure-pptx/unnamed-chunk-3-1.png" id="0" name="Picture 1"/>
+          <p:cNvPicPr>
+            <a:picLocks noGrp="1" noChangeAspect="1"/>
+          </p:cNvPicPr>
+          <p:nvPr/>
+        </p:nvPicPr>
+        <p:blipFill>
+          <a:blip r:embed="rId2"/>
+          <a:stretch>
+            <a:fillRect/>
+          </a:stretch>
+        </p:blipFill>
+        <p:spPr bwMode="auto">
+          <a:xfrm>
+            <a:off x="2844800" y="1193800"/>
+            <a:ext cx="3454400" cy="2882900"/>
+          </a:xfrm>
+          <a:prstGeom prst="rect">
+            <a:avLst/>
+          </a:prstGeom>
+          <a:noFill/>
+          <a:ln w="9525">
+            <a:noFill/>
+            <a:headEnd/>
+            <a:tailEnd/>
+          </a:ln>
+        </p:spPr>
+      </p:pic>
+      <p:sp>
+        <p:nvSpPr>
+          <p:cNvPr id="1" name="TextBox 3"/>
+          <p:cNvSpPr txBox="1"/>
+          <p:nvPr/>
+        </p:nvSpPr>
+        <p:spPr>
+          <a:xfrm>
+            <a:off x="457200" y="4076700"/>
+            <a:ext cx="8229600" cy="508000"/>
+          </a:xfrm>
+          <a:prstGeom prst="rect">
+            <a:avLst/>
+          </a:prstGeom>
+          <a:noFill/>
+        </p:spPr>
+        <p:txBody>
+          <a:bodyPr/>
+          <a:lstStyle/>
+          <a:p>
+            <a:pPr lvl="0" indent="0" marL="0" algn="ctr">
+              <a:buNone/>
+            </a:pPr>
+            <a:r>
+              <a:rPr/>
+              <a:t>Bubble plot showing the relationship between activity levels and calorie balance </a:t>
+            </a:r>
+          </a:p>
+        </p:txBody>
+      </p:sp>
+    </p:spTree>
+  </p:cSld>
+</p:sld>
+</file>
+
+<file path=ppt/slides/slide6.xml><?xml version="1.0" encoding="utf-8"?>
+<p:sld xmlns:a="http://schemas.openxmlformats.org/drawingml/2006/main" xmlns:r="http://schemas.openxmlformats.org/officeDocument/2006/relationships" xmlns:p="http://schemas.openxmlformats.org/presentationml/2006/main">
+  <p:cSld>
+    <p:spTree>
+      <p:nvGrpSpPr>
+        <p:cNvPr id="1" name=""/>
+        <p:cNvGrpSpPr/>
+        <p:nvPr/>
+      </p:nvGrpSpPr>
+      <p:grpSpPr>
+        <a:xfrm>
+          <a:off x="0" y="0"/>
+          <a:ext cx="0" cy="0"/>
+          <a:chOff x="0" y="0"/>
+          <a:chExt cx="0" cy="0"/>
+        </a:xfrm>
+      </p:grpSpPr>
+      <p:sp>
+        <p:nvSpPr>
+          <p:cNvPr id="2" name="Title 1"/>
+          <p:cNvSpPr>
+            <a:spLocks noGrp="1"/>
+          </p:cNvSpPr>
+          <p:nvPr>
+            <p:ph type="title"/>
+          </p:nvPr>
+        </p:nvSpPr>
+        <p:spPr/>
+        <p:txBody>
+          <a:bodyPr/>
+          <a:lstStyle/>
+          <a:p>
+            <a:pPr lvl="0" indent="0" marL="0">
+              <a:buNone/>
+            </a:pPr>
+            <a:r>
+              <a:rPr/>
+              <a:t>Conclusion</a:t>
             </a:r>
           </a:p>
         </p:txBody>
@@ -3453,35 +3609,25 @@
           <a:lstStyle/>
           <a:p>
             <a:pPr lvl="0" indent="0" marL="0">
-              <a:spcBef>
-                <a:spcPts val="3000"/>
-              </a:spcBef>
               <a:buNone/>
             </a:pPr>
             <a:r>
-              <a:rPr b="1"/>
-              <a:t>Appendix A</a:t>
-            </a:r>
-          </a:p>
-          <a:p>
-            <a:pPr lvl="0" indent="0" marL="0">
-              <a:buNone/>
-            </a:pPr>
-            <a:r>
               <a:rPr/>
-              <a:t>Some appendix information here</a:t>
-            </a:r>
-          </a:p>
-          <a:p>
-            <a:pPr lvl="0" indent="0" marL="0">
-              <a:spcBef>
-                <a:spcPts val="3000"/>
-              </a:spcBef>
-              <a:buNone/>
-            </a:pPr>
-            <a:r>
-              <a:rPr b="1"/>
-              <a:t>Appendix B</a:t>
+              <a:t>Results:</a:t>
+            </a:r>
+          </a:p>
+          <a:p>
+            <a:pPr lvl="0"/>
+            <a:r>
+              <a:rPr/>
+              <a:t>Sleep is important when controlling both stress levels and weight</a:t>
+            </a:r>
+          </a:p>
+          <a:p>
+            <a:pPr lvl="0"/>
+            <a:r>
+              <a:rPr/>
+              <a:t>Exercise in moderation</a:t>
             </a:r>
           </a:p>
         </p:txBody>

</xml_diff>